<commit_message>
Updating the file name
</commit_message>
<xml_diff>
--- a/Images/SI16.pptx
+++ b/Images/SI16.pptx
@@ -243,7 +243,7 @@
           <a:p>
             <a:fld id="{8CACEE41-4F71-4D6E-9D73-53C09A2723D8}" type="datetimeFigureOut">
               <a:rPr lang="en-US" smtClean="0"/>
-              <a:t>11/9/2021</a:t>
+              <a:t>11/19/2021</a:t>
             </a:fld>
             <a:endParaRPr lang="en-US"/>
           </a:p>
@@ -413,7 +413,7 @@
           <a:p>
             <a:fld id="{8CACEE41-4F71-4D6E-9D73-53C09A2723D8}" type="datetimeFigureOut">
               <a:rPr lang="en-US" smtClean="0"/>
-              <a:t>11/9/2021</a:t>
+              <a:t>11/19/2021</a:t>
             </a:fld>
             <a:endParaRPr lang="en-US"/>
           </a:p>
@@ -593,7 +593,7 @@
           <a:p>
             <a:fld id="{8CACEE41-4F71-4D6E-9D73-53C09A2723D8}" type="datetimeFigureOut">
               <a:rPr lang="en-US" smtClean="0"/>
-              <a:t>11/9/2021</a:t>
+              <a:t>11/19/2021</a:t>
             </a:fld>
             <a:endParaRPr lang="en-US"/>
           </a:p>
@@ -763,7 +763,7 @@
           <a:p>
             <a:fld id="{8CACEE41-4F71-4D6E-9D73-53C09A2723D8}" type="datetimeFigureOut">
               <a:rPr lang="en-US" smtClean="0"/>
-              <a:t>11/9/2021</a:t>
+              <a:t>11/19/2021</a:t>
             </a:fld>
             <a:endParaRPr lang="en-US"/>
           </a:p>
@@ -1007,7 +1007,7 @@
           <a:p>
             <a:fld id="{8CACEE41-4F71-4D6E-9D73-53C09A2723D8}" type="datetimeFigureOut">
               <a:rPr lang="en-US" smtClean="0"/>
-              <a:t>11/9/2021</a:t>
+              <a:t>11/19/2021</a:t>
             </a:fld>
             <a:endParaRPr lang="en-US"/>
           </a:p>
@@ -1239,7 +1239,7 @@
           <a:p>
             <a:fld id="{8CACEE41-4F71-4D6E-9D73-53C09A2723D8}" type="datetimeFigureOut">
               <a:rPr lang="en-US" smtClean="0"/>
-              <a:t>11/9/2021</a:t>
+              <a:t>11/19/2021</a:t>
             </a:fld>
             <a:endParaRPr lang="en-US"/>
           </a:p>
@@ -1606,7 +1606,7 @@
           <a:p>
             <a:fld id="{8CACEE41-4F71-4D6E-9D73-53C09A2723D8}" type="datetimeFigureOut">
               <a:rPr lang="en-US" smtClean="0"/>
-              <a:t>11/9/2021</a:t>
+              <a:t>11/19/2021</a:t>
             </a:fld>
             <a:endParaRPr lang="en-US"/>
           </a:p>
@@ -1724,7 +1724,7 @@
           <a:p>
             <a:fld id="{8CACEE41-4F71-4D6E-9D73-53C09A2723D8}" type="datetimeFigureOut">
               <a:rPr lang="en-US" smtClean="0"/>
-              <a:t>11/9/2021</a:t>
+              <a:t>11/19/2021</a:t>
             </a:fld>
             <a:endParaRPr lang="en-US"/>
           </a:p>
@@ -1819,7 +1819,7 @@
           <a:p>
             <a:fld id="{8CACEE41-4F71-4D6E-9D73-53C09A2723D8}" type="datetimeFigureOut">
               <a:rPr lang="en-US" smtClean="0"/>
-              <a:t>11/9/2021</a:t>
+              <a:t>11/19/2021</a:t>
             </a:fld>
             <a:endParaRPr lang="en-US"/>
           </a:p>
@@ -2096,7 +2096,7 @@
           <a:p>
             <a:fld id="{8CACEE41-4F71-4D6E-9D73-53C09A2723D8}" type="datetimeFigureOut">
               <a:rPr lang="en-US" smtClean="0"/>
-              <a:t>11/9/2021</a:t>
+              <a:t>11/19/2021</a:t>
             </a:fld>
             <a:endParaRPr lang="en-US"/>
           </a:p>
@@ -2353,7 +2353,7 @@
           <a:p>
             <a:fld id="{8CACEE41-4F71-4D6E-9D73-53C09A2723D8}" type="datetimeFigureOut">
               <a:rPr lang="en-US" smtClean="0"/>
-              <a:t>11/9/2021</a:t>
+              <a:t>11/19/2021</a:t>
             </a:fld>
             <a:endParaRPr lang="en-US"/>
           </a:p>
@@ -2566,7 +2566,7 @@
           <a:p>
             <a:fld id="{8CACEE41-4F71-4D6E-9D73-53C09A2723D8}" type="datetimeFigureOut">
               <a:rPr lang="en-US" smtClean="0"/>
-              <a:t>11/9/2021</a:t>
+              <a:t>11/19/2021</a:t>
             </a:fld>
             <a:endParaRPr lang="en-US"/>
           </a:p>
@@ -3113,7 +3113,7 @@
           </p:nvSpPr>
           <p:spPr>
             <a:xfrm>
-              <a:off x="2733367" y="3421101"/>
+              <a:off x="2733368" y="3373626"/>
               <a:ext cx="1018227" cy="338554"/>
             </a:xfrm>
             <a:prstGeom prst="rect">

</xml_diff>